<commit_message>
feature(master): add/modify shapes to/on master slide
</commit_message>
<xml_diff>
--- a/__tests__/pptx-templates/SlidesWithAdditionalMaster.pptx
+++ b/__tests__/pptx-templates/SlidesWithAdditionalMaster.pptx
@@ -200,7 +200,7 @@
           <a:p>
             <a:fld id="{82BFF952-1403-45BF-86A1-E2BA9ACE4472}" type="datetimeFigureOut">
               <a:rPr lang="de-DE" smtClean="0"/>
-              <a:t>12.04.2023</a:t>
+              <a:t>21.04.2023</a:t>
             </a:fld>
             <a:endParaRPr lang="de-DE"/>
           </a:p>
@@ -875,7 +875,7 @@
           <a:p>
             <a:fld id="{EFEC45B1-F788-46AE-AAC0-0AB7864C8CDB}" type="datetimeFigureOut">
               <a:rPr lang="de-DE" smtClean="0"/>
-              <a:t>12.04.2023</a:t>
+              <a:t>21.04.2023</a:t>
             </a:fld>
             <a:endParaRPr lang="de-DE"/>
           </a:p>
@@ -1163,7 +1163,7 @@
           <a:p>
             <a:fld id="{EFEC45B1-F788-46AE-AAC0-0AB7864C8CDB}" type="datetimeFigureOut">
               <a:rPr lang="de-DE" smtClean="0"/>
-              <a:t>12.04.2023</a:t>
+              <a:t>21.04.2023</a:t>
             </a:fld>
             <a:endParaRPr lang="de-DE"/>
           </a:p>
@@ -1361,7 +1361,7 @@
           <a:p>
             <a:fld id="{EFEC45B1-F788-46AE-AAC0-0AB7864C8CDB}" type="datetimeFigureOut">
               <a:rPr lang="de-DE" smtClean="0"/>
-              <a:t>12.04.2023</a:t>
+              <a:t>21.04.2023</a:t>
             </a:fld>
             <a:endParaRPr lang="de-DE"/>
           </a:p>
@@ -1569,7 +1569,7 @@
           <a:p>
             <a:fld id="{EFEC45B1-F788-46AE-AAC0-0AB7864C8CDB}" type="datetimeFigureOut">
               <a:rPr lang="de-DE" smtClean="0"/>
-              <a:t>12.04.2023</a:t>
+              <a:t>21.04.2023</a:t>
             </a:fld>
             <a:endParaRPr lang="de-DE"/>
           </a:p>
@@ -1789,7 +1789,7 @@
           <a:p>
             <a:fld id="{EFEC45B1-F788-46AE-AAC0-0AB7864C8CDB}" type="datetimeFigureOut">
               <a:rPr lang="de-DE" smtClean="0"/>
-              <a:t>12.04.2023</a:t>
+              <a:t>21.04.2023</a:t>
             </a:fld>
             <a:endParaRPr lang="de-DE"/>
           </a:p>
@@ -2013,7 +2013,7 @@
           <a:p>
             <a:fld id="{EFEC45B1-F788-46AE-AAC0-0AB7864C8CDB}" type="datetimeFigureOut">
               <a:rPr lang="de-DE" smtClean="0"/>
-              <a:t>12.04.2023</a:t>
+              <a:t>21.04.2023</a:t>
             </a:fld>
             <a:endParaRPr lang="de-DE"/>
           </a:p>
@@ -2211,7 +2211,7 @@
           <a:p>
             <a:fld id="{EFEC45B1-F788-46AE-AAC0-0AB7864C8CDB}" type="datetimeFigureOut">
               <a:rPr lang="de-DE" smtClean="0"/>
-              <a:t>12.04.2023</a:t>
+              <a:t>21.04.2023</a:t>
             </a:fld>
             <a:endParaRPr lang="de-DE"/>
           </a:p>
@@ -2486,7 +2486,7 @@
           <a:p>
             <a:fld id="{EFEC45B1-F788-46AE-AAC0-0AB7864C8CDB}" type="datetimeFigureOut">
               <a:rPr lang="de-DE" smtClean="0"/>
-              <a:t>12.04.2023</a:t>
+              <a:t>21.04.2023</a:t>
             </a:fld>
             <a:endParaRPr lang="de-DE"/>
           </a:p>
@@ -2627,7 +2627,7 @@
           <a:p>
             <a:fld id="{EFEC45B1-F788-46AE-AAC0-0AB7864C8CDB}" type="datetimeFigureOut">
               <a:rPr lang="de-DE" smtClean="0"/>
-              <a:t>12.04.2023</a:t>
+              <a:t>21.04.2023</a:t>
             </a:fld>
             <a:endParaRPr lang="de-DE"/>
           </a:p>
@@ -2740,7 +2740,7 @@
           <a:p>
             <a:fld id="{EFEC45B1-F788-46AE-AAC0-0AB7864C8CDB}" type="datetimeFigureOut">
               <a:rPr lang="de-DE" smtClean="0"/>
-              <a:t>12.04.2023</a:t>
+              <a:t>21.04.2023</a:t>
             </a:fld>
             <a:endParaRPr lang="de-DE"/>
           </a:p>
@@ -3051,7 +3051,7 @@
           <a:p>
             <a:fld id="{EFEC45B1-F788-46AE-AAC0-0AB7864C8CDB}" type="datetimeFigureOut">
               <a:rPr lang="de-DE" smtClean="0"/>
-              <a:t>12.04.2023</a:t>
+              <a:t>21.04.2023</a:t>
             </a:fld>
             <a:endParaRPr lang="de-DE"/>
           </a:p>
@@ -3275,7 +3275,7 @@
           <a:p>
             <a:fld id="{EFEC45B1-F788-46AE-AAC0-0AB7864C8CDB}" type="datetimeFigureOut">
               <a:rPr lang="de-DE" smtClean="0"/>
-              <a:t>12.04.2023</a:t>
+              <a:t>21.04.2023</a:t>
             </a:fld>
             <a:endParaRPr lang="de-DE"/>
           </a:p>
@@ -3563,7 +3563,7 @@
           <a:p>
             <a:fld id="{EFEC45B1-F788-46AE-AAC0-0AB7864C8CDB}" type="datetimeFigureOut">
               <a:rPr lang="de-DE" smtClean="0"/>
-              <a:t>12.04.2023</a:t>
+              <a:t>21.04.2023</a:t>
             </a:fld>
             <a:endParaRPr lang="de-DE"/>
           </a:p>
@@ -3761,7 +3761,7 @@
           <a:p>
             <a:fld id="{EFEC45B1-F788-46AE-AAC0-0AB7864C8CDB}" type="datetimeFigureOut">
               <a:rPr lang="de-DE" smtClean="0"/>
-              <a:t>12.04.2023</a:t>
+              <a:t>21.04.2023</a:t>
             </a:fld>
             <a:endParaRPr lang="de-DE"/>
           </a:p>
@@ -4036,7 +4036,7 @@
           <a:p>
             <a:fld id="{EFEC45B1-F788-46AE-AAC0-0AB7864C8CDB}" type="datetimeFigureOut">
               <a:rPr lang="de-DE" smtClean="0"/>
-              <a:t>12.04.2023</a:t>
+              <a:t>21.04.2023</a:t>
             </a:fld>
             <a:endParaRPr lang="de-DE"/>
           </a:p>
@@ -4301,7 +4301,7 @@
           <a:p>
             <a:fld id="{EFEC45B1-F788-46AE-AAC0-0AB7864C8CDB}" type="datetimeFigureOut">
               <a:rPr lang="de-DE" smtClean="0"/>
-              <a:t>12.04.2023</a:t>
+              <a:t>21.04.2023</a:t>
             </a:fld>
             <a:endParaRPr lang="de-DE"/>
           </a:p>
@@ -4713,7 +4713,7 @@
           <a:p>
             <a:fld id="{EFEC45B1-F788-46AE-AAC0-0AB7864C8CDB}" type="datetimeFigureOut">
               <a:rPr lang="de-DE" smtClean="0"/>
-              <a:t>12.04.2023</a:t>
+              <a:t>21.04.2023</a:t>
             </a:fld>
             <a:endParaRPr lang="de-DE"/>
           </a:p>
@@ -4854,7 +4854,7 @@
           <a:p>
             <a:fld id="{EFEC45B1-F788-46AE-AAC0-0AB7864C8CDB}" type="datetimeFigureOut">
               <a:rPr lang="de-DE" smtClean="0"/>
-              <a:t>12.04.2023</a:t>
+              <a:t>21.04.2023</a:t>
             </a:fld>
             <a:endParaRPr lang="de-DE"/>
           </a:p>
@@ -4967,7 +4967,7 @@
           <a:p>
             <a:fld id="{EFEC45B1-F788-46AE-AAC0-0AB7864C8CDB}" type="datetimeFigureOut">
               <a:rPr lang="de-DE" smtClean="0"/>
-              <a:t>12.04.2023</a:t>
+              <a:t>21.04.2023</a:t>
             </a:fld>
             <a:endParaRPr lang="de-DE"/>
           </a:p>
@@ -5278,7 +5278,7 @@
           <a:p>
             <a:fld id="{EFEC45B1-F788-46AE-AAC0-0AB7864C8CDB}" type="datetimeFigureOut">
               <a:rPr lang="de-DE" smtClean="0"/>
-              <a:t>12.04.2023</a:t>
+              <a:t>21.04.2023</a:t>
             </a:fld>
             <a:endParaRPr lang="de-DE"/>
           </a:p>
@@ -5519,7 +5519,7 @@
           <a:p>
             <a:fld id="{EFEC45B1-F788-46AE-AAC0-0AB7864C8CDB}" type="datetimeFigureOut">
               <a:rPr lang="de-DE" smtClean="0"/>
-              <a:t>12.04.2023</a:t>
+              <a:t>21.04.2023</a:t>
             </a:fld>
             <a:endParaRPr lang="de-DE"/>
           </a:p>
@@ -5661,6 +5661,55 @@
           <a:p>
             <a:pPr algn="ctr"/>
             <a:endParaRPr lang="de-DE"/>
+          </a:p>
+        </p:txBody>
+      </p:sp>
+      <p:sp>
+        <p:nvSpPr>
+          <p:cNvPr id="8" name="MasterRectangle">
+            <a:extLst>
+              <a:ext uri="{FF2B5EF4-FFF2-40B4-BE49-F238E27FC236}">
+                <a16:creationId xmlns:a16="http://schemas.microsoft.com/office/drawing/2014/main" id="{56342546-9D97-419E-B801-6FC6EAC4110D}"/>
+              </a:ext>
+            </a:extLst>
+          </p:cNvPr>
+          <p:cNvSpPr/>
+          <p:nvPr userDrawn="1"/>
+        </p:nvSpPr>
+        <p:spPr>
+          <a:xfrm>
+            <a:off x="8610600" y="5586761"/>
+            <a:ext cx="2743200" cy="590202"/>
+          </a:xfrm>
+          <a:prstGeom prst="rect">
+            <a:avLst/>
+          </a:prstGeom>
+        </p:spPr>
+        <p:style>
+          <a:lnRef idx="2">
+            <a:schemeClr val="accent1">
+              <a:shade val="50000"/>
+            </a:schemeClr>
+          </a:lnRef>
+          <a:fillRef idx="1">
+            <a:schemeClr val="accent1"/>
+          </a:fillRef>
+          <a:effectRef idx="0">
+            <a:schemeClr val="accent1"/>
+          </a:effectRef>
+          <a:fontRef idx="minor">
+            <a:schemeClr val="lt1"/>
+          </a:fontRef>
+        </p:style>
+        <p:txBody>
+          <a:bodyPr rtlCol="0" anchor="ctr"/>
+          <a:lstStyle/>
+          <a:p>
+            <a:pPr algn="ctr"/>
+            <a:r>
+              <a:rPr lang="de-DE"/>
+              <a:t>ModifyMe</a:t>
+            </a:r>
           </a:p>
         </p:txBody>
       </p:sp>
@@ -6137,7 +6186,7 @@
           <a:p>
             <a:fld id="{EFEC45B1-F788-46AE-AAC0-0AB7864C8CDB}" type="datetimeFigureOut">
               <a:rPr lang="de-DE" smtClean="0"/>
-              <a:t>12.04.2023</a:t>
+              <a:t>21.04.2023</a:t>
             </a:fld>
             <a:endParaRPr lang="de-DE"/>
           </a:p>

</xml_diff>